<commit_message>
Restructuring modules 02 and 04
</commit_message>
<xml_diff>
--- a/module02-retrieving-data-using-the-select-statement/results/select.pptx
+++ b/module02-retrieving-data-using-the-select-statement/results/select.pptx
@@ -230,7 +230,7 @@
           <a:p>
             <a:fld id="{0F9C1CCF-B725-44A7-AA57-5E433BD85C9F}" type="datetimeFigureOut">
               <a:rPr lang="en-US" smtClean="0"/>
-              <a:t>2/17/2018</a:t>
+              <a:t>4/5/2019</a:t>
             </a:fld>
             <a:endParaRPr lang="en-US"/>
           </a:p>
@@ -8387,7 +8387,7 @@
           <a:p>
             <a:fld id="{241EB5C9-1307-BA42-ABA2-0BC069CD8E7F}" type="datetimeFigureOut">
               <a:rPr lang="en-US" smtClean="0"/>
-              <a:t>2/17/2018</a:t>
+              <a:t>4/5/2019</a:t>
             </a:fld>
             <a:endParaRPr lang="en-US"/>
           </a:p>
@@ -8557,7 +8557,7 @@
           <a:p>
             <a:fld id="{241EB5C9-1307-BA42-ABA2-0BC069CD8E7F}" type="datetimeFigureOut">
               <a:rPr lang="en-US" smtClean="0"/>
-              <a:t>2/17/2018</a:t>
+              <a:t>4/5/2019</a:t>
             </a:fld>
             <a:endParaRPr lang="en-US"/>
           </a:p>
@@ -8737,7 +8737,7 @@
           <a:p>
             <a:fld id="{241EB5C9-1307-BA42-ABA2-0BC069CD8E7F}" type="datetimeFigureOut">
               <a:rPr lang="en-US" smtClean="0"/>
-              <a:t>2/17/2018</a:t>
+              <a:t>4/5/2019</a:t>
             </a:fld>
             <a:endParaRPr lang="en-US"/>
           </a:p>
@@ -8907,7 +8907,7 @@
           <a:p>
             <a:fld id="{241EB5C9-1307-BA42-ABA2-0BC069CD8E7F}" type="datetimeFigureOut">
               <a:rPr lang="en-US" smtClean="0"/>
-              <a:t>2/17/2018</a:t>
+              <a:t>4/5/2019</a:t>
             </a:fld>
             <a:endParaRPr lang="en-US"/>
           </a:p>
@@ -9153,7 +9153,7 @@
           <a:p>
             <a:fld id="{241EB5C9-1307-BA42-ABA2-0BC069CD8E7F}" type="datetimeFigureOut">
               <a:rPr lang="en-US" smtClean="0"/>
-              <a:t>2/17/2018</a:t>
+              <a:t>4/5/2019</a:t>
             </a:fld>
             <a:endParaRPr lang="en-US"/>
           </a:p>
@@ -9441,7 +9441,7 @@
           <a:p>
             <a:fld id="{241EB5C9-1307-BA42-ABA2-0BC069CD8E7F}" type="datetimeFigureOut">
               <a:rPr lang="en-US" smtClean="0"/>
-              <a:t>2/17/2018</a:t>
+              <a:t>4/5/2019</a:t>
             </a:fld>
             <a:endParaRPr lang="en-US"/>
           </a:p>
@@ -9863,7 +9863,7 @@
           <a:p>
             <a:fld id="{241EB5C9-1307-BA42-ABA2-0BC069CD8E7F}" type="datetimeFigureOut">
               <a:rPr lang="en-US" smtClean="0"/>
-              <a:t>2/17/2018</a:t>
+              <a:t>4/5/2019</a:t>
             </a:fld>
             <a:endParaRPr lang="en-US"/>
           </a:p>
@@ -9981,7 +9981,7 @@
           <a:p>
             <a:fld id="{241EB5C9-1307-BA42-ABA2-0BC069CD8E7F}" type="datetimeFigureOut">
               <a:rPr lang="en-US" smtClean="0"/>
-              <a:t>2/17/2018</a:t>
+              <a:t>4/5/2019</a:t>
             </a:fld>
             <a:endParaRPr lang="en-US"/>
           </a:p>
@@ -10076,7 +10076,7 @@
           <a:p>
             <a:fld id="{241EB5C9-1307-BA42-ABA2-0BC069CD8E7F}" type="datetimeFigureOut">
               <a:rPr lang="en-US" smtClean="0"/>
-              <a:t>2/17/2018</a:t>
+              <a:t>4/5/2019</a:t>
             </a:fld>
             <a:endParaRPr lang="en-US"/>
           </a:p>
@@ -10353,7 +10353,7 @@
           <a:p>
             <a:fld id="{241EB5C9-1307-BA42-ABA2-0BC069CD8E7F}" type="datetimeFigureOut">
               <a:rPr lang="en-US" smtClean="0"/>
-              <a:t>2/17/2018</a:t>
+              <a:t>4/5/2019</a:t>
             </a:fld>
             <a:endParaRPr lang="en-US"/>
           </a:p>
@@ -10606,7 +10606,7 @@
           <a:p>
             <a:fld id="{241EB5C9-1307-BA42-ABA2-0BC069CD8E7F}" type="datetimeFigureOut">
               <a:rPr lang="en-US" smtClean="0"/>
-              <a:t>2/17/2018</a:t>
+              <a:t>4/5/2019</a:t>
             </a:fld>
             <a:endParaRPr lang="en-US"/>
           </a:p>
@@ -10819,7 +10819,7 @@
           <a:p>
             <a:fld id="{241EB5C9-1307-BA42-ABA2-0BC069CD8E7F}" type="datetimeFigureOut">
               <a:rPr lang="en-US" smtClean="0"/>
-              <a:t>2/17/2018</a:t>
+              <a:t>4/5/2019</a:t>
             </a:fld>
             <a:endParaRPr lang="en-US"/>
           </a:p>
@@ -11736,7 +11736,7 @@
       </p:sp>
       <p:pic>
         <p:nvPicPr>
-          <p:cNvPr descr="../images/select-sas-02.png" id="0" name="Picture 1"/>
+          <p:cNvPr descr="../../images/select-sas-02.png" id="0" name="Picture 1"/>
           <p:cNvPicPr>
             <a:picLocks noGrp="1" noChangeAspect="1"/>
           </p:cNvPicPr>
@@ -12461,7 +12461,7 @@
       </p:sp>
       <p:pic>
         <p:nvPicPr>
-          <p:cNvPr descr="../images/select-sas-03.png" id="0" name="Picture 1"/>
+          <p:cNvPr descr="../../images/select-sas-03.png" id="0" name="Picture 1"/>
           <p:cNvPicPr>
             <a:picLocks noGrp="1" noChangeAspect="1"/>
           </p:cNvPicPr>
@@ -13326,7 +13326,7 @@
       </p:sp>
       <p:pic>
         <p:nvPicPr>
-          <p:cNvPr descr="../images/select-sas-04.png" id="0" name="Picture 1"/>
+          <p:cNvPr descr="../../images/select-sas-04.png" id="0" name="Picture 1"/>
           <p:cNvPicPr>
             <a:picLocks noGrp="1" noChangeAspect="1"/>
           </p:cNvPicPr>
@@ -13846,7 +13846,7 @@
                 </a:solidFill>
                 <a:latin typeface="Courier"/>
               </a:rPr>
-              <a:t>"../data/airlines_db.sqlite"</a:t>
+              <a:t>"../../data/airlines_db.sqlite"</a:t>
             </a:r>
             <a:r>
               <a:rPr sz="1800">
@@ -14326,7 +14326,7 @@
       </p:sp>
       <p:pic>
         <p:nvPicPr>
-          <p:cNvPr descr="../images/select-sas-01.png" id="0" name="Picture 1"/>
+          <p:cNvPr descr="../../images/select-sas-01.png" id="0" name="Picture 1"/>
           <p:cNvPicPr>
             <a:picLocks noGrp="1" noChangeAspect="1"/>
           </p:cNvPicPr>
@@ -14686,7 +14686,7 @@
                 </a:solidFill>
                 <a:latin typeface="Courier"/>
               </a:rPr>
-              <a:t>"../data/airlines_db.sqlite"</a:t>
+              <a:t>"../../data/airlines_db.sqlite"</a:t>
             </a:r>
             <a:r>
               <a:rPr sz="1800">

</xml_diff>